<commit_message>
wordpress login and create post scenario dummy sampler sample
</commit_message>
<xml_diff>
--- a/regex-extractor/data/regex-two-variable.pptx
+++ b/regex-extractor/data/regex-two-variable.pptx
@@ -6,8 +6,7 @@
   </p:sldMasterIdLst>
   <p:sldIdLst>
     <p:sldId id="256" r:id="rId2"/>
-    <p:sldId id="263" r:id="rId3"/>
-    <p:sldId id="264" r:id="rId4"/>
+    <p:sldId id="265" r:id="rId3"/>
   </p:sldIdLst>
   <p:sldSz cx="9144000" cy="6858000" type="screen4x3"/>
   <p:notesSz cx="6858000" cy="9144000"/>
@@ -290,7 +289,7 @@
           <a:p>
             <a:fld id="{CEABB72E-50CA-4C47-8950-A516672ECF2D}" type="datetimeFigureOut">
               <a:rPr lang="en-US" smtClean="0"/>
-              <a:t>13-Jul-13</a:t>
+              <a:t>27-Aug-13</a:t>
             </a:fld>
             <a:endParaRPr lang="en-US"/>
           </a:p>
@@ -460,7 +459,7 @@
           <a:p>
             <a:fld id="{CEABB72E-50CA-4C47-8950-A516672ECF2D}" type="datetimeFigureOut">
               <a:rPr lang="en-US" smtClean="0"/>
-              <a:t>13-Jul-13</a:t>
+              <a:t>27-Aug-13</a:t>
             </a:fld>
             <a:endParaRPr lang="en-US"/>
           </a:p>
@@ -640,7 +639,7 @@
           <a:p>
             <a:fld id="{CEABB72E-50CA-4C47-8950-A516672ECF2D}" type="datetimeFigureOut">
               <a:rPr lang="en-US" smtClean="0"/>
-              <a:t>13-Jul-13</a:t>
+              <a:t>27-Aug-13</a:t>
             </a:fld>
             <a:endParaRPr lang="en-US"/>
           </a:p>
@@ -810,7 +809,7 @@
           <a:p>
             <a:fld id="{CEABB72E-50CA-4C47-8950-A516672ECF2D}" type="datetimeFigureOut">
               <a:rPr lang="en-US" smtClean="0"/>
-              <a:t>13-Jul-13</a:t>
+              <a:t>27-Aug-13</a:t>
             </a:fld>
             <a:endParaRPr lang="en-US"/>
           </a:p>
@@ -1056,7 +1055,7 @@
           <a:p>
             <a:fld id="{CEABB72E-50CA-4C47-8950-A516672ECF2D}" type="datetimeFigureOut">
               <a:rPr lang="en-US" smtClean="0"/>
-              <a:t>13-Jul-13</a:t>
+              <a:t>27-Aug-13</a:t>
             </a:fld>
             <a:endParaRPr lang="en-US"/>
           </a:p>
@@ -1344,7 +1343,7 @@
           <a:p>
             <a:fld id="{CEABB72E-50CA-4C47-8950-A516672ECF2D}" type="datetimeFigureOut">
               <a:rPr lang="en-US" smtClean="0"/>
-              <a:t>13-Jul-13</a:t>
+              <a:t>27-Aug-13</a:t>
             </a:fld>
             <a:endParaRPr lang="en-US"/>
           </a:p>
@@ -1766,7 +1765,7 @@
           <a:p>
             <a:fld id="{CEABB72E-50CA-4C47-8950-A516672ECF2D}" type="datetimeFigureOut">
               <a:rPr lang="en-US" smtClean="0"/>
-              <a:t>13-Jul-13</a:t>
+              <a:t>27-Aug-13</a:t>
             </a:fld>
             <a:endParaRPr lang="en-US"/>
           </a:p>
@@ -1884,7 +1883,7 @@
           <a:p>
             <a:fld id="{CEABB72E-50CA-4C47-8950-A516672ECF2D}" type="datetimeFigureOut">
               <a:rPr lang="en-US" smtClean="0"/>
-              <a:t>13-Jul-13</a:t>
+              <a:t>27-Aug-13</a:t>
             </a:fld>
             <a:endParaRPr lang="en-US"/>
           </a:p>
@@ -1979,7 +1978,7 @@
           <a:p>
             <a:fld id="{CEABB72E-50CA-4C47-8950-A516672ECF2D}" type="datetimeFigureOut">
               <a:rPr lang="en-US" smtClean="0"/>
-              <a:t>13-Jul-13</a:t>
+              <a:t>27-Aug-13</a:t>
             </a:fld>
             <a:endParaRPr lang="en-US"/>
           </a:p>
@@ -2256,7 +2255,7 @@
           <a:p>
             <a:fld id="{CEABB72E-50CA-4C47-8950-A516672ECF2D}" type="datetimeFigureOut">
               <a:rPr lang="en-US" smtClean="0"/>
-              <a:t>13-Jul-13</a:t>
+              <a:t>27-Aug-13</a:t>
             </a:fld>
             <a:endParaRPr lang="en-US"/>
           </a:p>
@@ -2509,7 +2508,7 @@
           <a:p>
             <a:fld id="{CEABB72E-50CA-4C47-8950-A516672ECF2D}" type="datetimeFigureOut">
               <a:rPr lang="en-US" smtClean="0"/>
-              <a:t>13-Jul-13</a:t>
+              <a:t>27-Aug-13</a:t>
             </a:fld>
             <a:endParaRPr lang="en-US"/>
           </a:p>
@@ -2722,7 +2721,7 @@
           <a:p>
             <a:fld id="{CEABB72E-50CA-4C47-8950-A516672ECF2D}" type="datetimeFigureOut">
               <a:rPr lang="en-US" smtClean="0"/>
-              <a:t>13-Jul-13</a:t>
+              <a:t>27-Aug-13</a:t>
             </a:fld>
             <a:endParaRPr lang="en-US"/>
           </a:p>
@@ -3120,24 +3119,20 @@
           <a:lstStyle/>
           <a:p>
             <a:r>
+              <a:rPr lang="en-US" dirty="0" smtClean="0"/>
+              <a:t>How to debug </a:t>
+            </a:r>
+            <a:r>
               <a:rPr lang="en-US" dirty="0" err="1" smtClean="0"/>
               <a:t>jMeter</a:t>
             </a:r>
             <a:r>
               <a:rPr lang="en-US" dirty="0" smtClean="0"/>
-              <a:t> tutorial – </a:t>
+              <a:t> </a:t>
             </a:r>
             <a:r>
               <a:rPr lang="en-US" dirty="0" err="1" smtClean="0"/>
-              <a:t>RegEx</a:t>
-            </a:r>
-            <a:r>
-              <a:rPr lang="en-US" dirty="0" smtClean="0"/>
-              <a:t> </a:t>
-            </a:r>
-            <a:r>
-              <a:rPr lang="en-US" dirty="0" smtClean="0"/>
-              <a:t>extract two variables</a:t>
+              <a:t>TestPlan</a:t>
             </a:r>
             <a:endParaRPr lang="en-US" dirty="0"/>
           </a:p>
@@ -3331,33 +3326,7 @@
               <a:buFont typeface="Arial" pitchFamily="34" charset="0"/>
               <a:buChar char="•"/>
             </a:pPr>
-            <a:r>
-              <a:rPr lang="en-US" dirty="0" smtClean="0"/>
-              <a:t>How </a:t>
-            </a:r>
-            <a:r>
-              <a:rPr lang="en-US" dirty="0" smtClean="0"/>
-              <a:t>to use regex extractor to extract </a:t>
-            </a:r>
-            <a:r>
-              <a:rPr lang="en-US" dirty="0" smtClean="0"/>
-              <a:t>two variables from JSON arrays</a:t>
-            </a:r>
             <a:endParaRPr lang="en-US" dirty="0" smtClean="0"/>
-          </a:p>
-          <a:p>
-            <a:pPr marL="457200" indent="-457200" algn="l">
-              <a:buFont typeface="Arial" pitchFamily="34" charset="0"/>
-              <a:buChar char="•"/>
-            </a:pPr>
-            <a:r>
-              <a:rPr lang="en-US" dirty="0" smtClean="0"/>
-              <a:t>View </a:t>
-            </a:r>
-            <a:r>
-              <a:rPr lang="en-US" dirty="0" smtClean="0"/>
-              <a:t>full screen by pressing bottom right icon as shown below</a:t>
-            </a:r>
           </a:p>
           <a:p>
             <a:pPr marL="457200" indent="-457200" algn="l">
@@ -3371,69 +3340,47 @@
               <a:buFont typeface="Arial" pitchFamily="34" charset="0"/>
               <a:buChar char="•"/>
             </a:pPr>
+            <a:r>
+              <a:rPr lang="en-US" dirty="0" smtClean="0"/>
+              <a:t>Jmeter.log</a:t>
+            </a:r>
+          </a:p>
+          <a:p>
+            <a:pPr marL="457200" indent="-457200" algn="l">
+              <a:buFont typeface="Arial" pitchFamily="34" charset="0"/>
+              <a:buChar char="•"/>
+            </a:pPr>
+            <a:r>
+              <a:rPr lang="en-US" dirty="0" smtClean="0"/>
+              <a:t>Debug sampler</a:t>
+            </a:r>
+          </a:p>
+          <a:p>
+            <a:pPr marL="457200" indent="-457200" algn="l">
+              <a:buFont typeface="Arial" pitchFamily="34" charset="0"/>
+              <a:buChar char="•"/>
+            </a:pPr>
+            <a:r>
+              <a:rPr lang="en-US" dirty="0" smtClean="0"/>
+              <a:t>View Result Tree listener</a:t>
+            </a:r>
+          </a:p>
+          <a:p>
+            <a:pPr marL="457200" indent="-457200" algn="l">
+              <a:buFont typeface="Arial" pitchFamily="34" charset="0"/>
+              <a:buChar char="•"/>
+            </a:pPr>
             <a:endParaRPr lang="en-US" dirty="0" smtClean="0"/>
           </a:p>
           <a:p>
-            <a:pPr algn="l"/>
-            <a:r>
-              <a:rPr lang="en-US" dirty="0"/>
-              <a:t> </a:t>
-            </a:r>
-            <a:r>
-              <a:rPr lang="en-US" dirty="0" smtClean="0"/>
-              <a:t>   LETS SEE IT IN ACTION. </a:t>
-            </a:r>
-            <a:r>
-              <a:rPr lang="en-US" smtClean="0">
-                <a:sym typeface="Wingdings" pitchFamily="2" charset="2"/>
-              </a:rPr>
-              <a:t></a:t>
-            </a:r>
-            <a:endParaRPr lang="en-US" dirty="0"/>
-          </a:p>
-        </p:txBody>
-      </p:sp>
-      <p:pic>
-        <p:nvPicPr>
-          <p:cNvPr id="1026" name="Picture 2" descr="C:\Workspace\Temp\view-kapsule-fullscreen.jpg"/>
-          <p:cNvPicPr>
-            <a:picLocks noChangeAspect="1" noChangeArrowheads="1"/>
-          </p:cNvPicPr>
-          <p:nvPr/>
-        </p:nvPicPr>
-        <p:blipFill>
-          <a:blip r:embed="rId2">
-            <a:extLst>
-              <a:ext uri="{28A0092B-C50C-407E-A947-70E740481C1C}">
-                <a14:useLocalDpi xmlns:a14="http://schemas.microsoft.com/office/drawing/2010/main" val="0"/>
-              </a:ext>
-            </a:extLst>
-          </a:blip>
-          <a:srcRect/>
-          <a:stretch>
-            <a:fillRect/>
-          </a:stretch>
-        </p:blipFill>
-        <p:spPr bwMode="auto">
-          <a:xfrm>
-            <a:off x="1524000" y="3542052"/>
-            <a:ext cx="2362200" cy="1238250"/>
-          </a:xfrm>
-          <a:prstGeom prst="rect">
-            <a:avLst/>
-          </a:prstGeom>
-          <a:noFill/>
-          <a:extLst>
-            <a:ext uri="{909E8E84-426E-40DD-AFC4-6F175D3DCCD1}">
-              <a14:hiddenFill xmlns:a14="http://schemas.microsoft.com/office/drawing/2010/main">
-                <a:solidFill>
-                  <a:srgbClr val="FFFFFF"/>
-                </a:solidFill>
-              </a14:hiddenFill>
-            </a:ext>
-          </a:extLst>
-        </p:spPr>
-      </p:pic>
+            <a:pPr marL="457200" indent="-457200" algn="l">
+              <a:buFont typeface="Arial" pitchFamily="34" charset="0"/>
+              <a:buChar char="•"/>
+            </a:pPr>
+            <a:endParaRPr lang="en-US" dirty="0" smtClean="0"/>
+          </a:p>
+        </p:txBody>
+      </p:sp>
     </p:spTree>
     <p:extLst>
       <p:ext uri="{BB962C8B-B14F-4D97-AF65-F5344CB8AC3E}">
@@ -3654,8 +3601,90 @@
             </a:pPr>
             <a:r>
               <a:rPr lang="en-US" dirty="0" smtClean="0"/>
-              <a:t>subtle issues while creating this tutorial</a:t>
-            </a:r>
+              <a:t>Thanks you. </a:t>
+            </a:r>
+            <a:r>
+              <a:rPr lang="en-US" dirty="0" smtClean="0">
+                <a:sym typeface="Wingdings" pitchFamily="2" charset="2"/>
+              </a:rPr>
+              <a:t></a:t>
+            </a:r>
+          </a:p>
+          <a:p>
+            <a:pPr algn="l"/>
+            <a:endParaRPr lang="en-US" dirty="0" smtClean="0">
+              <a:sym typeface="Wingdings" pitchFamily="2" charset="2"/>
+            </a:endParaRPr>
+          </a:p>
+          <a:p>
+            <a:pPr marL="457200" indent="-457200" algn="l">
+              <a:buFont typeface="Arial" pitchFamily="34" charset="0"/>
+              <a:buChar char="•"/>
+            </a:pPr>
+            <a:r>
+              <a:rPr lang="en-US" dirty="0" smtClean="0">
+                <a:sym typeface="Wingdings" pitchFamily="2" charset="2"/>
+              </a:rPr>
+              <a:t>Credits:</a:t>
+            </a:r>
+          </a:p>
+          <a:p>
+            <a:pPr algn="l"/>
+            <a:r>
+              <a:rPr lang="en-US" dirty="0" smtClean="0">
+                <a:sym typeface="Wingdings" pitchFamily="2" charset="2"/>
+              </a:rPr>
+              <a:t>	- Sound track : </a:t>
+            </a:r>
+            <a:r>
+              <a:rPr lang="en-US" b="1" dirty="0"/>
+              <a:t>“Solitude” (by </a:t>
+            </a:r>
+            <a:r>
+              <a:rPr lang="en-US" b="1" dirty="0">
+                <a:hlinkClick r:id="rId2"/>
+              </a:rPr>
+              <a:t>Entertainment for the </a:t>
+            </a:r>
+            <a:r>
+              <a:rPr lang="en-US" b="1" dirty="0" err="1">
+                <a:hlinkClick r:id="rId2"/>
+              </a:rPr>
+              <a:t>Braindead</a:t>
+            </a:r>
+            <a:r>
+              <a:rPr lang="en-US" b="1" dirty="0"/>
+              <a:t>) </a:t>
+            </a:r>
+            <a:r>
+              <a:rPr lang="en-US" b="1" dirty="0" smtClean="0"/>
+              <a:t> </a:t>
+            </a:r>
+          </a:p>
+          <a:p>
+            <a:pPr algn="l"/>
+            <a:endParaRPr lang="en-US" b="1" dirty="0"/>
+          </a:p>
+          <a:p>
+            <a:pPr marL="457200" indent="-457200" algn="l">
+              <a:buFont typeface="Arial" pitchFamily="34" charset="0"/>
+              <a:buChar char="•"/>
+            </a:pPr>
+            <a:r>
+              <a:rPr lang="en-US" dirty="0" smtClean="0">
+                <a:sym typeface="Wingdings" pitchFamily="2" charset="2"/>
+              </a:rPr>
+              <a:t>Get a free kPoint account to create your </a:t>
+            </a:r>
+            <a:r>
+              <a:rPr lang="en-US" smtClean="0">
+                <a:sym typeface="Wingdings" pitchFamily="2" charset="2"/>
+              </a:rPr>
+              <a:t>own screencast. </a:t>
+            </a:r>
+            <a:endParaRPr lang="en-US" dirty="0">
+              <a:sym typeface="Wingdings" pitchFamily="2" charset="2"/>
+            </a:endParaRPr>
           </a:p>
           <a:p>
             <a:pPr marL="914400" lvl="1" indent="-457200" algn="l">
@@ -3663,112 +3692,14 @@
               <a:buChar char="•"/>
             </a:pPr>
             <a:r>
-              <a:rPr lang="en-US" dirty="0" smtClean="0"/>
-              <a:t>The </a:t>
-            </a:r>
-            <a:r>
-              <a:rPr lang="en-US" dirty="0" err="1" smtClean="0"/>
-              <a:t>javascript</a:t>
-            </a:r>
-            <a:r>
-              <a:rPr lang="en-US" dirty="0" smtClean="0"/>
-              <a:t> in the while controller throws </a:t>
-            </a:r>
-            <a:r>
-              <a:rPr lang="en-US" dirty="0" err="1" smtClean="0"/>
-              <a:t>excetption</a:t>
-            </a:r>
-            <a:r>
-              <a:rPr lang="en-US" dirty="0" smtClean="0"/>
-              <a:t> if there is space in last round and curly bracket. Check the </a:t>
-            </a:r>
-            <a:r>
-              <a:rPr lang="en-US" dirty="0" err="1" smtClean="0"/>
-              <a:t>jmeter</a:t>
-            </a:r>
-            <a:r>
-              <a:rPr lang="en-US" dirty="0" smtClean="0"/>
-              <a:t> log for exception, if your while condition is not existing/entering.</a:t>
-            </a:r>
-          </a:p>
-          <a:p>
-            <a:pPr marL="914400" lvl="1" indent="-457200" algn="l">
-              <a:buFont typeface="Arial" pitchFamily="34" charset="0"/>
-              <a:buChar char="•"/>
-            </a:pPr>
-            <a:r>
-              <a:rPr lang="en-US" dirty="0" smtClean="0"/>
-              <a:t>The </a:t>
-            </a:r>
-            <a:r>
-              <a:rPr lang="en-US" dirty="0" err="1" smtClean="0"/>
-              <a:t>javascript</a:t>
-            </a:r>
-            <a:r>
-              <a:rPr lang="en-US" dirty="0" smtClean="0"/>
-              <a:t> in while controller did not like the </a:t>
-            </a:r>
-            <a:r>
-              <a:rPr lang="en-US" dirty="0" err="1" smtClean="0"/>
-              <a:t>loopcount</a:t>
-            </a:r>
-            <a:r>
-              <a:rPr lang="en-US" dirty="0" smtClean="0"/>
-              <a:t> and </a:t>
-            </a:r>
-            <a:r>
-              <a:rPr lang="en-US" dirty="0" err="1" smtClean="0"/>
-              <a:t>finalcount</a:t>
-            </a:r>
-            <a:r>
-              <a:rPr lang="en-US" dirty="0" smtClean="0"/>
-              <a:t>, when exported as integer from the </a:t>
-            </a:r>
-            <a:r>
-              <a:rPr lang="en-US" dirty="0" err="1" smtClean="0"/>
-              <a:t>beanshell</a:t>
-            </a:r>
-            <a:r>
-              <a:rPr lang="en-US" dirty="0" smtClean="0"/>
-              <a:t>. I had to convert them to string in </a:t>
-            </a:r>
-            <a:r>
-              <a:rPr lang="en-US" dirty="0" err="1" smtClean="0"/>
-              <a:t>beanshell</a:t>
-            </a:r>
-            <a:r>
-              <a:rPr lang="en-US" dirty="0" smtClean="0"/>
-              <a:t>, and again back to integer in the </a:t>
-            </a:r>
-            <a:r>
-              <a:rPr lang="en-US" dirty="0" err="1" smtClean="0"/>
-              <a:t>javascript</a:t>
-            </a:r>
-            <a:r>
-              <a:rPr lang="en-US" dirty="0" smtClean="0"/>
-              <a:t> </a:t>
-            </a:r>
-            <a:r>
-              <a:rPr lang="en-US" dirty="0" err="1" smtClean="0"/>
-              <a:t>comparision</a:t>
-            </a:r>
-            <a:r>
-              <a:rPr lang="en-US" dirty="0" smtClean="0"/>
-              <a:t>. </a:t>
-            </a:r>
-            <a:r>
-              <a:rPr lang="en-US" dirty="0" smtClean="0">
+              <a:rPr lang="en-US" dirty="0">
                 <a:sym typeface="Wingdings" pitchFamily="2" charset="2"/>
               </a:rPr>
-              <a:t></a:t>
-            </a:r>
-            <a:endParaRPr lang="en-US" dirty="0" smtClean="0"/>
-          </a:p>
-          <a:p>
-            <a:pPr marL="914400" lvl="1" indent="-457200" algn="l">
-              <a:buFont typeface="Arial" pitchFamily="34" charset="0"/>
-              <a:buChar char="•"/>
-            </a:pPr>
+              <a:t>http://www.kpoint.com/plans/</a:t>
+            </a:r>
+          </a:p>
+          <a:p>
+            <a:pPr algn="l"/>
             <a:endParaRPr lang="en-US" dirty="0" smtClean="0"/>
           </a:p>
         </p:txBody>
@@ -3776,255 +3707,7 @@
     </p:spTree>
     <p:extLst>
       <p:ext uri="{BB962C8B-B14F-4D97-AF65-F5344CB8AC3E}">
-        <p14:creationId xmlns:p14="http://schemas.microsoft.com/office/powerpoint/2010/main" val="2351139008"/>
-      </p:ext>
-    </p:extLst>
-  </p:cSld>
-  <p:clrMapOvr>
-    <a:masterClrMapping/>
-  </p:clrMapOvr>
-  <p:timing>
-    <p:tnLst>
-      <p:par>
-        <p:cTn id="1" dur="indefinite" restart="never" nodeType="tmRoot"/>
-      </p:par>
-    </p:tnLst>
-  </p:timing>
-</p:sld>
-</file>
-
-<file path=ppt/slides/slide3.xml><?xml version="1.0" encoding="utf-8"?>
-<p:sld xmlns:a="http://schemas.openxmlformats.org/drawingml/2006/main" xmlns:r="http://schemas.openxmlformats.org/officeDocument/2006/relationships" xmlns:p="http://schemas.openxmlformats.org/presentationml/2006/main">
-  <p:cSld>
-    <p:spTree>
-      <p:nvGrpSpPr>
-        <p:cNvPr id="1" name=""/>
-        <p:cNvGrpSpPr/>
-        <p:nvPr/>
-      </p:nvGrpSpPr>
-      <p:grpSpPr>
-        <a:xfrm>
-          <a:off x="0" y="0"/>
-          <a:ext cx="0" cy="0"/>
-          <a:chOff x="0" y="0"/>
-          <a:chExt cx="0" cy="0"/>
-        </a:xfrm>
-      </p:grpSpPr>
-      <p:sp>
-        <p:nvSpPr>
-          <p:cNvPr id="5" name="Content Placeholder 2"/>
-          <p:cNvSpPr txBox="1">
-            <a:spLocks/>
-          </p:cNvSpPr>
-          <p:nvPr/>
-        </p:nvSpPr>
-        <p:spPr>
-          <a:xfrm>
-            <a:off x="457200" y="914400"/>
-            <a:ext cx="8229600" cy="5211763"/>
-          </a:xfrm>
-          <a:prstGeom prst="rect">
-            <a:avLst/>
-          </a:prstGeom>
-        </p:spPr>
-        <p:txBody>
-          <a:bodyPr vert="horz" lIns="91440" tIns="45720" rIns="91440" bIns="45720" rtlCol="0">
-            <a:normAutofit/>
-          </a:bodyPr>
-          <a:lstStyle>
-            <a:lvl1pPr marL="0" indent="0" algn="ctr" defTabSz="914400" rtl="0" eaLnBrk="1" latinLnBrk="0" hangingPunct="1">
-              <a:spcBef>
-                <a:spcPct val="20000"/>
-              </a:spcBef>
-              <a:buFont typeface="Arial" pitchFamily="34" charset="0"/>
-              <a:buNone/>
-              <a:defRPr sz="3200" kern="1200">
-                <a:solidFill>
-                  <a:schemeClr val="tx1">
-                    <a:tint val="75000"/>
-                  </a:schemeClr>
-                </a:solidFill>
-                <a:latin typeface="+mn-lt"/>
-                <a:ea typeface="+mn-ea"/>
-                <a:cs typeface="+mn-cs"/>
-              </a:defRPr>
-            </a:lvl1pPr>
-            <a:lvl2pPr marL="457200" indent="0" algn="ctr" defTabSz="914400" rtl="0" eaLnBrk="1" latinLnBrk="0" hangingPunct="1">
-              <a:spcBef>
-                <a:spcPct val="20000"/>
-              </a:spcBef>
-              <a:buFont typeface="Arial" pitchFamily="34" charset="0"/>
-              <a:buNone/>
-              <a:defRPr sz="2800" kern="1200">
-                <a:solidFill>
-                  <a:schemeClr val="tx1">
-                    <a:tint val="75000"/>
-                  </a:schemeClr>
-                </a:solidFill>
-                <a:latin typeface="+mn-lt"/>
-                <a:ea typeface="+mn-ea"/>
-                <a:cs typeface="+mn-cs"/>
-              </a:defRPr>
-            </a:lvl2pPr>
-            <a:lvl3pPr marL="914400" indent="0" algn="ctr" defTabSz="914400" rtl="0" eaLnBrk="1" latinLnBrk="0" hangingPunct="1">
-              <a:spcBef>
-                <a:spcPct val="20000"/>
-              </a:spcBef>
-              <a:buFont typeface="Arial" pitchFamily="34" charset="0"/>
-              <a:buNone/>
-              <a:defRPr sz="2400" kern="1200">
-                <a:solidFill>
-                  <a:schemeClr val="tx1">
-                    <a:tint val="75000"/>
-                  </a:schemeClr>
-                </a:solidFill>
-                <a:latin typeface="+mn-lt"/>
-                <a:ea typeface="+mn-ea"/>
-                <a:cs typeface="+mn-cs"/>
-              </a:defRPr>
-            </a:lvl3pPr>
-            <a:lvl4pPr marL="1371600" indent="0" algn="ctr" defTabSz="914400" rtl="0" eaLnBrk="1" latinLnBrk="0" hangingPunct="1">
-              <a:spcBef>
-                <a:spcPct val="20000"/>
-              </a:spcBef>
-              <a:buFont typeface="Arial" pitchFamily="34" charset="0"/>
-              <a:buNone/>
-              <a:defRPr sz="2000" kern="1200">
-                <a:solidFill>
-                  <a:schemeClr val="tx1">
-                    <a:tint val="75000"/>
-                  </a:schemeClr>
-                </a:solidFill>
-                <a:latin typeface="+mn-lt"/>
-                <a:ea typeface="+mn-ea"/>
-                <a:cs typeface="+mn-cs"/>
-              </a:defRPr>
-            </a:lvl4pPr>
-            <a:lvl5pPr marL="1828800" indent="0" algn="ctr" defTabSz="914400" rtl="0" eaLnBrk="1" latinLnBrk="0" hangingPunct="1">
-              <a:spcBef>
-                <a:spcPct val="20000"/>
-              </a:spcBef>
-              <a:buFont typeface="Arial" pitchFamily="34" charset="0"/>
-              <a:buNone/>
-              <a:defRPr sz="2000" kern="1200">
-                <a:solidFill>
-                  <a:schemeClr val="tx1">
-                    <a:tint val="75000"/>
-                  </a:schemeClr>
-                </a:solidFill>
-                <a:latin typeface="+mn-lt"/>
-                <a:ea typeface="+mn-ea"/>
-                <a:cs typeface="+mn-cs"/>
-              </a:defRPr>
-            </a:lvl5pPr>
-            <a:lvl6pPr marL="2286000" indent="0" algn="ctr" defTabSz="914400" rtl="0" eaLnBrk="1" latinLnBrk="0" hangingPunct="1">
-              <a:spcBef>
-                <a:spcPct val="20000"/>
-              </a:spcBef>
-              <a:buFont typeface="Arial" pitchFamily="34" charset="0"/>
-              <a:buNone/>
-              <a:defRPr sz="2000" kern="1200">
-                <a:solidFill>
-                  <a:schemeClr val="tx1">
-                    <a:tint val="75000"/>
-                  </a:schemeClr>
-                </a:solidFill>
-                <a:latin typeface="+mn-lt"/>
-                <a:ea typeface="+mn-ea"/>
-                <a:cs typeface="+mn-cs"/>
-              </a:defRPr>
-            </a:lvl6pPr>
-            <a:lvl7pPr marL="2743200" indent="0" algn="ctr" defTabSz="914400" rtl="0" eaLnBrk="1" latinLnBrk="0" hangingPunct="1">
-              <a:spcBef>
-                <a:spcPct val="20000"/>
-              </a:spcBef>
-              <a:buFont typeface="Arial" pitchFamily="34" charset="0"/>
-              <a:buNone/>
-              <a:defRPr sz="2000" kern="1200">
-                <a:solidFill>
-                  <a:schemeClr val="tx1">
-                    <a:tint val="75000"/>
-                  </a:schemeClr>
-                </a:solidFill>
-                <a:latin typeface="+mn-lt"/>
-                <a:ea typeface="+mn-ea"/>
-                <a:cs typeface="+mn-cs"/>
-              </a:defRPr>
-            </a:lvl7pPr>
-            <a:lvl8pPr marL="3200400" indent="0" algn="ctr" defTabSz="914400" rtl="0" eaLnBrk="1" latinLnBrk="0" hangingPunct="1">
-              <a:spcBef>
-                <a:spcPct val="20000"/>
-              </a:spcBef>
-              <a:buFont typeface="Arial" pitchFamily="34" charset="0"/>
-              <a:buNone/>
-              <a:defRPr sz="2000" kern="1200">
-                <a:solidFill>
-                  <a:schemeClr val="tx1">
-                    <a:tint val="75000"/>
-                  </a:schemeClr>
-                </a:solidFill>
-                <a:latin typeface="+mn-lt"/>
-                <a:ea typeface="+mn-ea"/>
-                <a:cs typeface="+mn-cs"/>
-              </a:defRPr>
-            </a:lvl8pPr>
-            <a:lvl9pPr marL="3657600" indent="0" algn="ctr" defTabSz="914400" rtl="0" eaLnBrk="1" latinLnBrk="0" hangingPunct="1">
-              <a:spcBef>
-                <a:spcPct val="20000"/>
-              </a:spcBef>
-              <a:buFont typeface="Arial" pitchFamily="34" charset="0"/>
-              <a:buNone/>
-              <a:defRPr sz="2000" kern="1200">
-                <a:solidFill>
-                  <a:schemeClr val="tx1">
-                    <a:tint val="75000"/>
-                  </a:schemeClr>
-                </a:solidFill>
-                <a:latin typeface="+mn-lt"/>
-                <a:ea typeface="+mn-ea"/>
-                <a:cs typeface="+mn-cs"/>
-              </a:defRPr>
-            </a:lvl9pPr>
-          </a:lstStyle>
-          <a:p>
-            <a:pPr marL="457200" indent="-457200" algn="l">
-              <a:buFont typeface="Arial" pitchFamily="34" charset="0"/>
-              <a:buChar char="•"/>
-            </a:pPr>
-            <a:r>
-              <a:rPr lang="en-US" dirty="0" smtClean="0"/>
-              <a:t>Clone the </a:t>
-            </a:r>
-            <a:r>
-              <a:rPr lang="en-US" dirty="0"/>
-              <a:t>scripts from  </a:t>
-            </a:r>
-            <a:r>
-              <a:rPr lang="en-US" dirty="0" smtClean="0">
-                <a:hlinkClick r:id="rId2"/>
-              </a:rPr>
-              <a:t>https</a:t>
-            </a:r>
-            <a:r>
-              <a:rPr lang="en-US" dirty="0">
-                <a:hlinkClick r:id="rId2"/>
-              </a:rPr>
-              <a:t>://</a:t>
-            </a:r>
-            <a:r>
-              <a:rPr lang="en-US" dirty="0" smtClean="0">
-                <a:hlinkClick r:id="rId2"/>
-              </a:rPr>
-              <a:t>github.com/msapariya/jmeter-recipes</a:t>
-            </a:r>
-            <a:endParaRPr lang="en-US" dirty="0" smtClean="0"/>
-          </a:p>
-        </p:txBody>
-      </p:sp>
-    </p:spTree>
-    <p:extLst>
-      <p:ext uri="{BB962C8B-B14F-4D97-AF65-F5344CB8AC3E}">
-        <p14:creationId xmlns:p14="http://schemas.microsoft.com/office/powerpoint/2010/main" val="3912624491"/>
+        <p14:creationId xmlns:p14="http://schemas.microsoft.com/office/powerpoint/2010/main" val="1573586912"/>
       </p:ext>
     </p:extLst>
   </p:cSld>

</xml_diff>